<commit_message>
got one question done
</commit_message>
<xml_diff>
--- a/ACA Fam Feud.pptx
+++ b/ACA Fam Feud.pptx
@@ -17579,7 +17579,7 @@
           <a:p>
             <a:fld id="{7EBE7F2F-AABE-4892-8D4C-C67BF5CA2C98}" type="datetimeFigureOut">
               <a:rPr lang="en-GB" smtClean="0"/>
-              <a:t>01/05/2024</a:t>
+              <a:t>04/05/2024</a:t>
             </a:fld>
             <a:endParaRPr lang="en-GB" dirty="0"/>
           </a:p>
@@ -17863,7 +17863,7 @@
           <a:p>
             <a:fld id="{98B8ED53-04B1-4CE0-9945-0D8638B42437}" type="datetimeFigureOut">
               <a:rPr lang="en-IN" smtClean="0"/>
-              <a:t>01-05-2024</a:t>
+              <a:t>04-05-2024</a:t>
             </a:fld>
             <a:endParaRPr lang="en-IN"/>
           </a:p>
@@ -18294,7 +18294,7 @@
           <a:p>
             <a:fld id="{98B8ED53-04B1-4CE0-9945-0D8638B42437}" type="datetimeFigureOut">
               <a:rPr lang="en-IN" smtClean="0"/>
-              <a:t>01-05-2024</a:t>
+              <a:t>04-05-2024</a:t>
             </a:fld>
             <a:endParaRPr lang="en-IN"/>
           </a:p>
@@ -18436,7 +18436,7 @@
           <a:p>
             <a:fld id="{98B8ED53-04B1-4CE0-9945-0D8638B42437}" type="datetimeFigureOut">
               <a:rPr lang="en-IN" smtClean="0"/>
-              <a:t>01-05-2024</a:t>
+              <a:t>04-05-2024</a:t>
             </a:fld>
             <a:endParaRPr lang="en-IN"/>
           </a:p>
@@ -18549,7 +18549,7 @@
           <a:p>
             <a:fld id="{98B8ED53-04B1-4CE0-9945-0D8638B42437}" type="datetimeFigureOut">
               <a:rPr lang="en-IN" smtClean="0"/>
-              <a:t>01-05-2024</a:t>
+              <a:t>04-05-2024</a:t>
             </a:fld>
             <a:endParaRPr lang="en-IN"/>
           </a:p>
@@ -18862,7 +18862,7 @@
           <a:p>
             <a:fld id="{98B8ED53-04B1-4CE0-9945-0D8638B42437}" type="datetimeFigureOut">
               <a:rPr lang="en-IN" smtClean="0"/>
-              <a:t>01-05-2024</a:t>
+              <a:t>04-05-2024</a:t>
             </a:fld>
             <a:endParaRPr lang="en-IN"/>
           </a:p>
@@ -19151,7 +19151,7 @@
           <a:p>
             <a:fld id="{98B8ED53-04B1-4CE0-9945-0D8638B42437}" type="datetimeFigureOut">
               <a:rPr lang="en-IN" smtClean="0"/>
-              <a:t>01-05-2024</a:t>
+              <a:t>04-05-2024</a:t>
             </a:fld>
             <a:endParaRPr lang="en-IN"/>
           </a:p>
@@ -19351,7 +19351,7 @@
           <a:p>
             <a:fld id="{98B8ED53-04B1-4CE0-9945-0D8638B42437}" type="datetimeFigureOut">
               <a:rPr lang="en-IN" smtClean="0"/>
-              <a:t>01-05-2024</a:t>
+              <a:t>04-05-2024</a:t>
             </a:fld>
             <a:endParaRPr lang="en-IN"/>
           </a:p>
@@ -19561,7 +19561,7 @@
           <a:p>
             <a:fld id="{98B8ED53-04B1-4CE0-9945-0D8638B42437}" type="datetimeFigureOut">
               <a:rPr lang="en-IN" smtClean="0"/>
-              <a:t>01-05-2024</a:t>
+              <a:t>04-05-2024</a:t>
             </a:fld>
             <a:endParaRPr lang="en-IN"/>
           </a:p>
@@ -19804,7 +19804,7 @@
           <a:p>
             <a:fld id="{98B8ED53-04B1-4CE0-9945-0D8638B42437}" type="datetimeFigureOut">
               <a:rPr lang="en-IN" smtClean="0"/>
-              <a:t>01-05-2024</a:t>
+              <a:t>04-05-2024</a:t>
             </a:fld>
             <a:endParaRPr lang="en-IN"/>
           </a:p>
@@ -30804,7 +30804,27 @@
                 <a:effectLst/>
                 <a:latin typeface="Patua One" panose="02000000000000000000" pitchFamily="2" charset="0"/>
               </a:rPr>
-              <a:t>, consectetur </a:t>
+              <a:t>, </a:t>
+            </a:r>
+            <a:r>
+              <a:rPr lang="en-IN" b="0" i="0" dirty="0" err="1">
+                <a:solidFill>
+                  <a:schemeClr val="bg1"/>
+                </a:solidFill>
+                <a:effectLst/>
+                <a:latin typeface="Patua One" panose="02000000000000000000" pitchFamily="2" charset="0"/>
+              </a:rPr>
+              <a:t>consectetur</a:t>
+            </a:r>
+            <a:r>
+              <a:rPr lang="en-IN" b="0" i="0" dirty="0">
+                <a:solidFill>
+                  <a:schemeClr val="bg1"/>
+                </a:solidFill>
+                <a:effectLst/>
+                <a:latin typeface="Patua One" panose="02000000000000000000" pitchFamily="2" charset="0"/>
+              </a:rPr>
+              <a:t> </a:t>
             </a:r>
             <a:r>
               <a:rPr lang="en-IN" b="0" i="0" dirty="0" err="1">
@@ -30884,7 +30904,27 @@
                 <a:effectLst/>
                 <a:latin typeface="Patua One" panose="02000000000000000000" pitchFamily="2" charset="0"/>
               </a:rPr>
-              <a:t> tempor </a:t>
+              <a:t> </a:t>
+            </a:r>
+            <a:r>
+              <a:rPr lang="en-IN" b="0" i="0" dirty="0" err="1">
+                <a:solidFill>
+                  <a:schemeClr val="bg1"/>
+                </a:solidFill>
+                <a:effectLst/>
+                <a:latin typeface="Patua One" panose="02000000000000000000" pitchFamily="2" charset="0"/>
+              </a:rPr>
+              <a:t>tempor</a:t>
+            </a:r>
+            <a:r>
+              <a:rPr lang="en-IN" b="0" i="0" dirty="0">
+                <a:solidFill>
+                  <a:schemeClr val="bg1"/>
+                </a:solidFill>
+                <a:effectLst/>
+                <a:latin typeface="Patua One" panose="02000000000000000000" pitchFamily="2" charset="0"/>
+              </a:rPr>
+              <a:t> </a:t>
             </a:r>
             <a:r>
               <a:rPr lang="en-IN" b="0" i="0" dirty="0" err="1">
@@ -40391,7 +40431,27 @@
                 <a:effectLst/>
                 <a:latin typeface="Patua One" panose="02000000000000000000" pitchFamily="2" charset="0"/>
               </a:rPr>
-              <a:t>, consectetur </a:t>
+              <a:t>, </a:t>
+            </a:r>
+            <a:r>
+              <a:rPr lang="en-IN" b="0" i="0" dirty="0" err="1">
+                <a:solidFill>
+                  <a:schemeClr val="bg1"/>
+                </a:solidFill>
+                <a:effectLst/>
+                <a:latin typeface="Patua One" panose="02000000000000000000" pitchFamily="2" charset="0"/>
+              </a:rPr>
+              <a:t>consectetur</a:t>
+            </a:r>
+            <a:r>
+              <a:rPr lang="en-IN" b="0" i="0" dirty="0">
+                <a:solidFill>
+                  <a:schemeClr val="bg1"/>
+                </a:solidFill>
+                <a:effectLst/>
+                <a:latin typeface="Patua One" panose="02000000000000000000" pitchFamily="2" charset="0"/>
+              </a:rPr>
+              <a:t> </a:t>
             </a:r>
             <a:r>
               <a:rPr lang="en-IN" b="0" i="0" dirty="0" err="1">
@@ -40471,7 +40531,27 @@
                 <a:effectLst/>
                 <a:latin typeface="Patua One" panose="02000000000000000000" pitchFamily="2" charset="0"/>
               </a:rPr>
-              <a:t> tempor </a:t>
+              <a:t> </a:t>
+            </a:r>
+            <a:r>
+              <a:rPr lang="en-IN" b="0" i="0" dirty="0" err="1">
+                <a:solidFill>
+                  <a:schemeClr val="bg1"/>
+                </a:solidFill>
+                <a:effectLst/>
+                <a:latin typeface="Patua One" panose="02000000000000000000" pitchFamily="2" charset="0"/>
+              </a:rPr>
+              <a:t>tempor</a:t>
+            </a:r>
+            <a:r>
+              <a:rPr lang="en-IN" b="0" i="0" dirty="0">
+                <a:solidFill>
+                  <a:schemeClr val="bg1"/>
+                </a:solidFill>
+                <a:effectLst/>
+                <a:latin typeface="Patua One" panose="02000000000000000000" pitchFamily="2" charset="0"/>
+              </a:rPr>
+              <a:t> </a:t>
             </a:r>
             <a:r>
               <a:rPr lang="en-IN" b="0" i="0" dirty="0" err="1">

</xml_diff>